<commit_message>
actualización sesión 0 / Introducción a Matlab
</commit_message>
<xml_diff>
--- a/Sesión_0/Introducción.pptx
+++ b/Sesión_0/Introducción.pptx
@@ -167,7 +167,7 @@
 <file path=ppt/revisionInfo.xml><?xml version="1.0" encoding="utf-8"?>
 <p1510:revInfo xmlns:a="http://schemas.openxmlformats.org/drawingml/2006/main" xmlns:r="http://schemas.openxmlformats.org/officeDocument/2006/relationships" xmlns:p1510="http://schemas.microsoft.com/office/powerpoint/2015/10/main">
   <p1510:revLst>
-    <p1510:client id="{F051727E-E815-4CBA-87EC-595602D579B3}" v="21" dt="2025-01-04T00:02:11.213"/>
+    <p1510:client id="{F051727E-E815-4CBA-87EC-595602D579B3}" v="30" dt="2025-01-14T00:21:09.509"/>
   </p1510:revLst>
 </p1510:revInfo>
 </file>
@@ -214,16 +214,24 @@
   <pc:docChgLst>
     <pc:chgData name="JHEYSON FABIAN VILLAVISAN BUITRAGO" userId="e5ced5c2-d787-455d-b115-4f08a699b8c8" providerId="ADAL" clId="{F051727E-E815-4CBA-87EC-595602D579B3}"/>
     <pc:docChg chg="custSel modSld">
-      <pc:chgData name="JHEYSON FABIAN VILLAVISAN BUITRAGO" userId="e5ced5c2-d787-455d-b115-4f08a699b8c8" providerId="ADAL" clId="{F051727E-E815-4CBA-87EC-595602D579B3}" dt="2025-01-04T00:02:53.888" v="459" actId="114"/>
+      <pc:chgData name="JHEYSON FABIAN VILLAVISAN BUITRAGO" userId="e5ced5c2-d787-455d-b115-4f08a699b8c8" providerId="ADAL" clId="{F051727E-E815-4CBA-87EC-595602D579B3}" dt="2025-01-14T00:21:13.732" v="486" actId="113"/>
       <pc:docMkLst>
         <pc:docMk/>
       </pc:docMkLst>
       <pc:sldChg chg="modSp mod">
-        <pc:chgData name="JHEYSON FABIAN VILLAVISAN BUITRAGO" userId="e5ced5c2-d787-455d-b115-4f08a699b8c8" providerId="ADAL" clId="{F051727E-E815-4CBA-87EC-595602D579B3}" dt="2025-01-04T00:02:53.888" v="459" actId="114"/>
+        <pc:chgData name="JHEYSON FABIAN VILLAVISAN BUITRAGO" userId="e5ced5c2-d787-455d-b115-4f08a699b8c8" providerId="ADAL" clId="{F051727E-E815-4CBA-87EC-595602D579B3}" dt="2025-01-14T00:21:13.732" v="486" actId="113"/>
         <pc:sldMkLst>
           <pc:docMk/>
           <pc:sldMk cId="0" sldId="261"/>
         </pc:sldMkLst>
+        <pc:spChg chg="mod">
+          <ac:chgData name="JHEYSON FABIAN VILLAVISAN BUITRAGO" userId="e5ced5c2-d787-455d-b115-4f08a699b8c8" providerId="ADAL" clId="{F051727E-E815-4CBA-87EC-595602D579B3}" dt="2025-01-14T00:21:13.732" v="486" actId="113"/>
+          <ac:spMkLst>
+            <pc:docMk/>
+            <pc:sldMk cId="0" sldId="261"/>
+            <ac:spMk id="3" creationId="{59B9380A-11B1-FEE0-C677-C5094B4EF0B4}"/>
+          </ac:spMkLst>
+        </pc:spChg>
         <pc:spChg chg="mod">
           <ac:chgData name="JHEYSON FABIAN VILLAVISAN BUITRAGO" userId="e5ced5c2-d787-455d-b115-4f08a699b8c8" providerId="ADAL" clId="{F051727E-E815-4CBA-87EC-595602D579B3}" dt="2025-01-04T00:02:53.888" v="459" actId="114"/>
           <ac:spMkLst>
@@ -232,6 +240,14 @@
             <ac:spMk id="6" creationId="{97AA8CFD-3BCF-4D31-88D2-A24ABB62907A}"/>
           </ac:spMkLst>
         </pc:spChg>
+        <pc:graphicFrameChg chg="mod">
+          <ac:chgData name="JHEYSON FABIAN VILLAVISAN BUITRAGO" userId="e5ced5c2-d787-455d-b115-4f08a699b8c8" providerId="ADAL" clId="{F051727E-E815-4CBA-87EC-595602D579B3}" dt="2025-01-14T00:21:09.509" v="485" actId="20577"/>
+          <ac:graphicFrameMkLst>
+            <pc:docMk/>
+            <pc:sldMk cId="0" sldId="261"/>
+            <ac:graphicFrameMk id="7" creationId="{3B28400A-9287-40BA-9001-2E821D706B4D}"/>
+          </ac:graphicFrameMkLst>
+        </pc:graphicFrameChg>
       </pc:sldChg>
       <pc:sldChg chg="modSp mod">
         <pc:chgData name="JHEYSON FABIAN VILLAVISAN BUITRAGO" userId="e5ced5c2-d787-455d-b115-4f08a699b8c8" providerId="ADAL" clId="{F051727E-E815-4CBA-87EC-595602D579B3}" dt="2025-01-03T23:58:35.352" v="263" actId="20577"/>
@@ -249,7 +265,38 @@
         </pc:spChg>
       </pc:sldChg>
       <pc:sldChg chg="modSp mod">
-        <pc:chgData name="JHEYSON FABIAN VILLAVISAN BUITRAGO" userId="e5ced5c2-d787-455d-b115-4f08a699b8c8" providerId="ADAL" clId="{F051727E-E815-4CBA-87EC-595602D579B3}" dt="2025-01-04T00:02:11.213" v="455" actId="14100"/>
+        <pc:chgData name="JHEYSON FABIAN VILLAVISAN BUITRAGO" userId="e5ced5c2-d787-455d-b115-4f08a699b8c8" providerId="ADAL" clId="{F051727E-E815-4CBA-87EC-595602D579B3}" dt="2025-01-14T00:20:56.124" v="476" actId="404"/>
+        <pc:sldMkLst>
+          <pc:docMk/>
+          <pc:sldMk cId="3709177429" sldId="274"/>
+        </pc:sldMkLst>
+        <pc:spChg chg="mod">
+          <ac:chgData name="JHEYSON FABIAN VILLAVISAN BUITRAGO" userId="e5ced5c2-d787-455d-b115-4f08a699b8c8" providerId="ADAL" clId="{F051727E-E815-4CBA-87EC-595602D579B3}" dt="2025-01-14T00:20:33.745" v="462" actId="14100"/>
+          <ac:spMkLst>
+            <pc:docMk/>
+            <pc:sldMk cId="3709177429" sldId="274"/>
+            <ac:spMk id="3" creationId="{4F1F9CC3-49B8-41A8-9878-3805D57595F8}"/>
+          </ac:spMkLst>
+        </pc:spChg>
+        <pc:spChg chg="mod">
+          <ac:chgData name="JHEYSON FABIAN VILLAVISAN BUITRAGO" userId="e5ced5c2-d787-455d-b115-4f08a699b8c8" providerId="ADAL" clId="{F051727E-E815-4CBA-87EC-595602D579B3}" dt="2025-01-14T00:20:27.931" v="460" actId="14100"/>
+          <ac:spMkLst>
+            <pc:docMk/>
+            <pc:sldMk cId="3709177429" sldId="274"/>
+            <ac:spMk id="4" creationId="{2C7E43D4-8286-4BEE-907B-3A35AE701C90}"/>
+          </ac:spMkLst>
+        </pc:spChg>
+        <pc:spChg chg="mod">
+          <ac:chgData name="JHEYSON FABIAN VILLAVISAN BUITRAGO" userId="e5ced5c2-d787-455d-b115-4f08a699b8c8" providerId="ADAL" clId="{F051727E-E815-4CBA-87EC-595602D579B3}" dt="2025-01-14T00:20:56.124" v="476" actId="404"/>
+          <ac:spMkLst>
+            <pc:docMk/>
+            <pc:sldMk cId="3709177429" sldId="274"/>
+            <ac:spMk id="10" creationId="{AF4E183E-A171-4923-A99E-D149888CEC37}"/>
+          </ac:spMkLst>
+        </pc:spChg>
+      </pc:sldChg>
+      <pc:sldChg chg="modSp mod">
+        <pc:chgData name="JHEYSON FABIAN VILLAVISAN BUITRAGO" userId="e5ced5c2-d787-455d-b115-4f08a699b8c8" providerId="ADAL" clId="{F051727E-E815-4CBA-87EC-595602D579B3}" dt="2025-01-14T00:20:48.181" v="475" actId="20577"/>
         <pc:sldMkLst>
           <pc:docMk/>
           <pc:sldMk cId="2965408220" sldId="280"/>
@@ -263,7 +310,7 @@
           </ac:spMkLst>
         </pc:spChg>
         <pc:graphicFrameChg chg="mod modGraphic">
-          <ac:chgData name="JHEYSON FABIAN VILLAVISAN BUITRAGO" userId="e5ced5c2-d787-455d-b115-4f08a699b8c8" providerId="ADAL" clId="{F051727E-E815-4CBA-87EC-595602D579B3}" dt="2025-01-04T00:01:33.605" v="451" actId="13926"/>
+          <ac:chgData name="JHEYSON FABIAN VILLAVISAN BUITRAGO" userId="e5ced5c2-d787-455d-b115-4f08a699b8c8" providerId="ADAL" clId="{F051727E-E815-4CBA-87EC-595602D579B3}" dt="2025-01-14T00:20:48.181" v="475" actId="20577"/>
           <ac:graphicFrameMkLst>
             <pc:docMk/>
             <pc:sldMk cId="2965408220" sldId="280"/>
@@ -1447,7 +1494,7 @@
         <a:p>
           <a:r>
             <a:rPr lang="es-CO" dirty="0"/>
-            <a:t>Examen final 24% + CO/AU 6%</a:t>
+            <a:t>Examen final/Proyecto 24% + CO/AU 6%</a:t>
           </a:r>
         </a:p>
       </dgm:t>
@@ -2014,7 +2061,7 @@
           </a:pPr>
           <a:r>
             <a:rPr lang="es-CO" sz="3800" kern="1200" dirty="0"/>
-            <a:t>Examen final 24% + CO/AU 6%</a:t>
+            <a:t>Examen final/Proyecto 24% + CO/AU 6%</a:t>
           </a:r>
         </a:p>
       </dsp:txBody>
@@ -3401,7 +3448,7 @@
               <a:pPr>
                 <a:defRPr/>
               </a:pPr>
-              <a:t>3/01/2025</a:t>
+              <a:t>13/01/2025</a:t>
             </a:fld>
             <a:endParaRPr lang="es-CO"/>
           </a:p>
@@ -3644,7 +3691,7 @@
               <a:pPr>
                 <a:defRPr/>
               </a:pPr>
-              <a:t>3/01/2025</a:t>
+              <a:t>13/01/2025</a:t>
             </a:fld>
             <a:endParaRPr lang="es-CO"/>
           </a:p>
@@ -5886,7 +5933,7 @@
           <a:p>
             <a:fld id="{9CF7635E-2D71-42E7-9E6C-FBB85A15A85F}" type="datetimeFigureOut">
               <a:rPr lang="es-CO" smtClean="0"/>
-              <a:t>3/01/2025</a:t>
+              <a:t>13/01/2025</a:t>
             </a:fld>
             <a:endParaRPr lang="es-CO"/>
           </a:p>
@@ -6152,7 +6199,7 @@
           <a:p>
             <a:fld id="{9CF7635E-2D71-42E7-9E6C-FBB85A15A85F}" type="datetimeFigureOut">
               <a:rPr lang="es-CO" smtClean="0"/>
-              <a:t>3/01/2025</a:t>
+              <a:t>13/01/2025</a:t>
             </a:fld>
             <a:endParaRPr lang="es-CO"/>
           </a:p>
@@ -6368,7 +6415,7 @@
           <a:p>
             <a:fld id="{9CF7635E-2D71-42E7-9E6C-FBB85A15A85F}" type="datetimeFigureOut">
               <a:rPr lang="es-CO" smtClean="0"/>
-              <a:t>3/01/2025</a:t>
+              <a:t>13/01/2025</a:t>
             </a:fld>
             <a:endParaRPr lang="es-CO"/>
           </a:p>
@@ -7997,7 +8044,7 @@
           <a:p>
             <a:fld id="{9CF7635E-2D71-42E7-9E6C-FBB85A15A85F}" type="datetimeFigureOut">
               <a:rPr lang="es-CO" smtClean="0"/>
-              <a:t>3/01/2025</a:t>
+              <a:t>13/01/2025</a:t>
             </a:fld>
             <a:endParaRPr lang="es-CO"/>
           </a:p>
@@ -8444,7 +8491,7 @@
           <a:p>
             <a:fld id="{9CF7635E-2D71-42E7-9E6C-FBB85A15A85F}" type="datetimeFigureOut">
               <a:rPr lang="es-CO" smtClean="0"/>
-              <a:t>3/01/2025</a:t>
+              <a:t>13/01/2025</a:t>
             </a:fld>
             <a:endParaRPr lang="es-CO"/>
           </a:p>
@@ -8718,7 +8765,7 @@
           <a:p>
             <a:fld id="{9CF7635E-2D71-42E7-9E6C-FBB85A15A85F}" type="datetimeFigureOut">
               <a:rPr lang="es-CO" smtClean="0"/>
-              <a:t>3/01/2025</a:t>
+              <a:t>13/01/2025</a:t>
             </a:fld>
             <a:endParaRPr lang="es-CO"/>
           </a:p>
@@ -9139,7 +9186,7 @@
           <a:p>
             <a:fld id="{9CF7635E-2D71-42E7-9E6C-FBB85A15A85F}" type="datetimeFigureOut">
               <a:rPr lang="es-CO" smtClean="0"/>
-              <a:t>3/01/2025</a:t>
+              <a:t>13/01/2025</a:t>
             </a:fld>
             <a:endParaRPr lang="es-CO"/>
           </a:p>
@@ -9287,7 +9334,7 @@
           <a:p>
             <a:fld id="{9CF7635E-2D71-42E7-9E6C-FBB85A15A85F}" type="datetimeFigureOut">
               <a:rPr lang="es-CO" smtClean="0"/>
-              <a:t>3/01/2025</a:t>
+              <a:t>13/01/2025</a:t>
             </a:fld>
             <a:endParaRPr lang="es-CO"/>
           </a:p>
@@ -9406,7 +9453,7 @@
           <a:p>
             <a:fld id="{9CF7635E-2D71-42E7-9E6C-FBB85A15A85F}" type="datetimeFigureOut">
               <a:rPr lang="es-CO" smtClean="0"/>
-              <a:t>3/01/2025</a:t>
+              <a:t>13/01/2025</a:t>
             </a:fld>
             <a:endParaRPr lang="es-CO"/>
           </a:p>
@@ -9725,7 +9772,7 @@
           <a:p>
             <a:fld id="{9CF7635E-2D71-42E7-9E6C-FBB85A15A85F}" type="datetimeFigureOut">
               <a:rPr lang="es-CO" smtClean="0"/>
-              <a:t>3/01/2025</a:t>
+              <a:t>13/01/2025</a:t>
             </a:fld>
             <a:endParaRPr lang="es-CO"/>
           </a:p>
@@ -10020,7 +10067,7 @@
           <a:p>
             <a:fld id="{9CF7635E-2D71-42E7-9E6C-FBB85A15A85F}" type="datetimeFigureOut">
               <a:rPr lang="es-CO" smtClean="0"/>
-              <a:t>3/01/2025</a:t>
+              <a:t>13/01/2025</a:t>
             </a:fld>
             <a:endParaRPr lang="es-CO"/>
           </a:p>
@@ -10269,7 +10316,7 @@
           <a:p>
             <a:fld id="{9CF7635E-2D71-42E7-9E6C-FBB85A15A85F}" type="datetimeFigureOut">
               <a:rPr lang="es-CO" smtClean="0"/>
-              <a:t>3/01/2025</a:t>
+              <a:t>13/01/2025</a:t>
             </a:fld>
             <a:endParaRPr lang="es-CO"/>
           </a:p>
@@ -10789,7 +10836,7 @@
           <a:p>
             <a:pPr algn="ctr" eaLnBrk="1" hangingPunct="1"/>
             <a:r>
-              <a:rPr lang="es-CO" altLang="es-CO" sz="3600"/>
+              <a:rPr lang="es-CO" altLang="es-CO" sz="3600" dirty="0"/>
               <a:t>1</a:t>
             </a:r>
           </a:p>
@@ -11366,7 +11413,7 @@
         <p:spPr>
           <a:xfrm>
             <a:off x="4572000" y="1693943"/>
-            <a:ext cx="5111750" cy="5853113"/>
+            <a:ext cx="3688173" cy="3967305"/>
           </a:xfrm>
         </p:spPr>
         <p:txBody>
@@ -11462,7 +11509,7 @@
         <p:spPr>
           <a:xfrm>
             <a:off x="883827" y="2832063"/>
-            <a:ext cx="3008313" cy="4691063"/>
+            <a:ext cx="3008313" cy="1605049"/>
           </a:xfrm>
         </p:spPr>
         <p:txBody>
@@ -11756,9 +11803,10 @@
           <a:p>
             <a:pPr algn="ctr" eaLnBrk="1" hangingPunct="1"/>
             <a:r>
-              <a:rPr lang="es-CO" altLang="es-CO" sz="3600" b="0" dirty="0"/>
+              <a:rPr lang="es-CO" altLang="es-CO" sz="3200" b="0" dirty="0"/>
               <a:t>2</a:t>
             </a:r>
+            <a:endParaRPr lang="es-CO" altLang="es-CO" sz="3600" b="0" dirty="0"/>
           </a:p>
         </p:txBody>
       </p:sp>
@@ -13293,7 +13341,7 @@
           <p:nvPr>
             <p:extLst>
               <p:ext uri="{D42A27DB-BD31-4B8C-83A1-F6EECF244321}">
-                <p14:modId xmlns:p14="http://schemas.microsoft.com/office/powerpoint/2010/main" val="992405557"/>
+                <p14:modId xmlns:p14="http://schemas.microsoft.com/office/powerpoint/2010/main" val="2949396119"/>
               </p:ext>
             </p:extLst>
           </p:nvPr>
@@ -13559,12 +13607,8 @@
                         <a:defRPr/>
                       </a:pPr>
                       <a:r>
-                        <a:rPr lang="es-CO" sz="1000" dirty="0" err="1"/>
-                        <a:t>Intro</a:t>
-                      </a:r>
-                      <a:r>
                         <a:rPr lang="es-CO" sz="1000" dirty="0"/>
-                        <a:t> Matlab</a:t>
+                        <a:t>Introducción a Matlab</a:t>
                       </a:r>
                     </a:p>
                   </a:txBody>
@@ -16691,7 +16735,7 @@
           <p:nvPr>
             <p:extLst>
               <p:ext uri="{D42A27DB-BD31-4B8C-83A1-F6EECF244321}">
-                <p14:modId xmlns:p14="http://schemas.microsoft.com/office/powerpoint/2010/main" val="3894127405"/>
+                <p14:modId xmlns:p14="http://schemas.microsoft.com/office/powerpoint/2010/main" val="3319379854"/>
               </p:ext>
             </p:extLst>
           </p:nvPr>
@@ -17543,7 +17587,15 @@
           <a:p>
             <a:r>
               <a:rPr lang="es-CO" dirty="0"/>
-              <a:t>Se espera una dedicación independiente de al menos 8 horas semanales.</a:t>
+              <a:t>Se espera una dedicación independiente de al </a:t>
+            </a:r>
+            <a:r>
+              <a:rPr lang="es-CO" b="1" dirty="0"/>
+              <a:t>menos 8 horas semanales</a:t>
+            </a:r>
+            <a:r>
+              <a:rPr lang="es-CO" dirty="0"/>
+              <a:t>.</a:t>
             </a:r>
           </a:p>
         </p:txBody>
@@ -19925,14 +19977,6 @@
 </file>
 
 <file path=customXml/item1.xml><?xml version="1.0" encoding="utf-8"?>
-<p:properties xmlns:p="http://schemas.microsoft.com/office/2006/metadata/properties" xmlns:xsi="http://www.w3.org/2001/XMLSchema-instance" xmlns:pc="http://schemas.microsoft.com/office/infopath/2007/PartnerControls">
-  <documentManagement>
-    <_activity xmlns="bdc56f61-abc0-4f7e-bfec-a93ccd1ae886" xsi:nil="true"/>
-  </documentManagement>
-</p:properties>
-</file>
-
-<file path=customXml/item2.xml><?xml version="1.0" encoding="utf-8"?>
 <ct:contentTypeSchema xmlns:ct="http://schemas.microsoft.com/office/2006/metadata/contentType" xmlns:ma="http://schemas.microsoft.com/office/2006/metadata/properties/metaAttributes" ct:_="" ma:_="" ma:contentTypeName="Documento" ma:contentTypeID="0x0101007A62137D465CE64A8C883A4664514BF8" ma:contentTypeVersion="15" ma:contentTypeDescription="Crear nuevo documento." ma:contentTypeScope="" ma:versionID="a1bd1d59f691eb9bca6952b111268275">
   <xsd:schema xmlns:xsd="http://www.w3.org/2001/XMLSchema" xmlns:xs="http://www.w3.org/2001/XMLSchema" xmlns:p="http://schemas.microsoft.com/office/2006/metadata/properties" xmlns:ns3="669280c1-d17e-4d1d-bd7f-b4f14cc6bf1d" xmlns:ns4="bdc56f61-abc0-4f7e-bfec-a93ccd1ae886" targetNamespace="http://schemas.microsoft.com/office/2006/metadata/properties" ma:root="true" ma:fieldsID="d02990a02f19f0f9fc7b999b1809cae4" ns3:_="" ns4:_="">
     <xsd:import namespace="669280c1-d17e-4d1d-bd7f-b4f14cc6bf1d"/>
@@ -20167,6 +20211,14 @@
 </ct:contentTypeSchema>
 </file>
 
+<file path=customXml/item2.xml><?xml version="1.0" encoding="utf-8"?>
+<p:properties xmlns:p="http://schemas.microsoft.com/office/2006/metadata/properties" xmlns:xsi="http://www.w3.org/2001/XMLSchema-instance" xmlns:pc="http://schemas.microsoft.com/office/infopath/2007/PartnerControls">
+  <documentManagement>
+    <_activity xmlns="bdc56f61-abc0-4f7e-bfec-a93ccd1ae886" xsi:nil="true"/>
+  </documentManagement>
+</p:properties>
+</file>
+
 <file path=customXml/item3.xml><?xml version="1.0" encoding="utf-8"?>
 <?mso-contentType ?>
 <FormTemplates xmlns="http://schemas.microsoft.com/sharepoint/v3/contenttype/forms">
@@ -20177,23 +20229,6 @@
 </file>
 
 <file path=customXml/itemProps1.xml><?xml version="1.0" encoding="utf-8"?>
-<ds:datastoreItem xmlns:ds="http://schemas.openxmlformats.org/officeDocument/2006/customXml" ds:itemID="{0825853C-1B27-4995-A583-4D39F900BB7F}">
-  <ds:schemaRefs>
-    <ds:schemaRef ds:uri="http://schemas.microsoft.com/office/2006/documentManagement/types"/>
-    <ds:schemaRef ds:uri="http://purl.org/dc/dcmitype/"/>
-    <ds:schemaRef ds:uri="http://schemas.openxmlformats.org/package/2006/metadata/core-properties"/>
-    <ds:schemaRef ds:uri="669280c1-d17e-4d1d-bd7f-b4f14cc6bf1d"/>
-    <ds:schemaRef ds:uri="http://purl.org/dc/elements/1.1/"/>
-    <ds:schemaRef ds:uri="http://purl.org/dc/terms/"/>
-    <ds:schemaRef ds:uri="http://schemas.microsoft.com/office/infopath/2007/PartnerControls"/>
-    <ds:schemaRef ds:uri="bdc56f61-abc0-4f7e-bfec-a93ccd1ae886"/>
-    <ds:schemaRef ds:uri="http://schemas.microsoft.com/office/2006/metadata/properties"/>
-    <ds:schemaRef ds:uri="http://www.w3.org/XML/1998/namespace"/>
-  </ds:schemaRefs>
-</ds:datastoreItem>
-</file>
-
-<file path=customXml/itemProps2.xml><?xml version="1.0" encoding="utf-8"?>
 <ds:datastoreItem xmlns:ds="http://schemas.openxmlformats.org/officeDocument/2006/customXml" ds:itemID="{025820C3-FD82-4EFC-BF14-EAF1F9613F52}">
   <ds:schemaRefs>
     <ds:schemaRef ds:uri="http://schemas.microsoft.com/office/2006/metadata/contentType"/>
@@ -20212,6 +20247,23 @@
 </ds:datastoreItem>
 </file>
 
+<file path=customXml/itemProps2.xml><?xml version="1.0" encoding="utf-8"?>
+<ds:datastoreItem xmlns:ds="http://schemas.openxmlformats.org/officeDocument/2006/customXml" ds:itemID="{0825853C-1B27-4995-A583-4D39F900BB7F}">
+  <ds:schemaRefs>
+    <ds:schemaRef ds:uri="http://schemas.microsoft.com/office/2006/documentManagement/types"/>
+    <ds:schemaRef ds:uri="http://purl.org/dc/dcmitype/"/>
+    <ds:schemaRef ds:uri="http://schemas.openxmlformats.org/package/2006/metadata/core-properties"/>
+    <ds:schemaRef ds:uri="669280c1-d17e-4d1d-bd7f-b4f14cc6bf1d"/>
+    <ds:schemaRef ds:uri="http://purl.org/dc/elements/1.1/"/>
+    <ds:schemaRef ds:uri="http://purl.org/dc/terms/"/>
+    <ds:schemaRef ds:uri="http://schemas.microsoft.com/office/infopath/2007/PartnerControls"/>
+    <ds:schemaRef ds:uri="bdc56f61-abc0-4f7e-bfec-a93ccd1ae886"/>
+    <ds:schemaRef ds:uri="http://schemas.microsoft.com/office/2006/metadata/properties"/>
+    <ds:schemaRef ds:uri="http://www.w3.org/XML/1998/namespace"/>
+  </ds:schemaRefs>
+</ds:datastoreItem>
+</file>
+
 <file path=customXml/itemProps3.xml><?xml version="1.0" encoding="utf-8"?>
 <ds:datastoreItem xmlns:ds="http://schemas.openxmlformats.org/officeDocument/2006/customXml" ds:itemID="{4E8623C8-32E1-48B0-9F0A-13F2E9582B7E}">
   <ds:schemaRefs>

</xml_diff>

<commit_message>
Actualización README, Sesión 0 y 2
</commit_message>
<xml_diff>
--- a/Sesión_0/Introducción.pptx
+++ b/Sesión_0/Introducción.pptx
@@ -167,7 +167,7 @@
 <file path=ppt/revisionInfo.xml><?xml version="1.0" encoding="utf-8"?>
 <p1510:revInfo xmlns:a="http://schemas.openxmlformats.org/drawingml/2006/main" xmlns:r="http://schemas.openxmlformats.org/officeDocument/2006/relationships" xmlns:p1510="http://schemas.microsoft.com/office/powerpoint/2015/10/main">
   <p1510:revLst>
-    <p1510:client id="{F051727E-E815-4CBA-87EC-595602D579B3}" v="30" dt="2025-01-14T00:21:09.509"/>
+    <p1510:client id="{F051727E-E815-4CBA-87EC-595602D579B3}" v="33" dt="2025-01-14T17:54:46.064"/>
   </p1510:revLst>
 </p1510:revInfo>
 </file>
@@ -214,7 +214,7 @@
   <pc:docChgLst>
     <pc:chgData name="JHEYSON FABIAN VILLAVISAN BUITRAGO" userId="e5ced5c2-d787-455d-b115-4f08a699b8c8" providerId="ADAL" clId="{F051727E-E815-4CBA-87EC-595602D579B3}"/>
     <pc:docChg chg="custSel modSld">
-      <pc:chgData name="JHEYSON FABIAN VILLAVISAN BUITRAGO" userId="e5ced5c2-d787-455d-b115-4f08a699b8c8" providerId="ADAL" clId="{F051727E-E815-4CBA-87EC-595602D579B3}" dt="2025-01-14T00:21:13.732" v="486" actId="113"/>
+      <pc:chgData name="JHEYSON FABIAN VILLAVISAN BUITRAGO" userId="e5ced5c2-d787-455d-b115-4f08a699b8c8" providerId="ADAL" clId="{F051727E-E815-4CBA-87EC-595602D579B3}" dt="2025-01-14T17:55:02.606" v="514" actId="1076"/>
       <pc:docMkLst>
         <pc:docMk/>
       </pc:docMkLst>
@@ -249,12 +249,28 @@
           </ac:graphicFrameMkLst>
         </pc:graphicFrameChg>
       </pc:sldChg>
-      <pc:sldChg chg="modSp mod">
-        <pc:chgData name="JHEYSON FABIAN VILLAVISAN BUITRAGO" userId="e5ced5c2-d787-455d-b115-4f08a699b8c8" providerId="ADAL" clId="{F051727E-E815-4CBA-87EC-595602D579B3}" dt="2025-01-03T23:58:35.352" v="263" actId="20577"/>
+      <pc:sldChg chg="addSp modSp mod">
+        <pc:chgData name="JHEYSON FABIAN VILLAVISAN BUITRAGO" userId="e5ced5c2-d787-455d-b115-4f08a699b8c8" providerId="ADAL" clId="{F051727E-E815-4CBA-87EC-595602D579B3}" dt="2025-01-14T17:55:02.606" v="514" actId="1076"/>
         <pc:sldMkLst>
           <pc:docMk/>
           <pc:sldMk cId="0" sldId="268"/>
         </pc:sldMkLst>
+        <pc:spChg chg="add mod">
+          <ac:chgData name="JHEYSON FABIAN VILLAVISAN BUITRAGO" userId="e5ced5c2-d787-455d-b115-4f08a699b8c8" providerId="ADAL" clId="{F051727E-E815-4CBA-87EC-595602D579B3}" dt="2025-01-14T17:55:02.606" v="514" actId="1076"/>
+          <ac:spMkLst>
+            <pc:docMk/>
+            <pc:sldMk cId="0" sldId="268"/>
+            <ac:spMk id="3" creationId="{008BB48C-FC05-3615-A776-2D1677A4E9F1}"/>
+          </ac:spMkLst>
+        </pc:spChg>
+        <pc:spChg chg="mod">
+          <ac:chgData name="JHEYSON FABIAN VILLAVISAN BUITRAGO" userId="e5ced5c2-d787-455d-b115-4f08a699b8c8" providerId="ADAL" clId="{F051727E-E815-4CBA-87EC-595602D579B3}" dt="2025-01-14T17:54:53.633" v="510" actId="20577"/>
+          <ac:spMkLst>
+            <pc:docMk/>
+            <pc:sldMk cId="0" sldId="268"/>
+            <ac:spMk id="9" creationId="{DE1C5E17-B258-47EA-B96B-EF9524AC8863}"/>
+          </ac:spMkLst>
+        </pc:spChg>
         <pc:spChg chg="mod">
           <ac:chgData name="JHEYSON FABIAN VILLAVISAN BUITRAGO" userId="e5ced5c2-d787-455d-b115-4f08a699b8c8" providerId="ADAL" clId="{F051727E-E815-4CBA-87EC-595602D579B3}" dt="2025-01-03T23:58:35.352" v="263" actId="20577"/>
           <ac:spMkLst>
@@ -3448,7 +3464,7 @@
               <a:pPr>
                 <a:defRPr/>
               </a:pPr>
-              <a:t>13/01/2025</a:t>
+              <a:t>14/01/2025</a:t>
             </a:fld>
             <a:endParaRPr lang="es-CO"/>
           </a:p>
@@ -3691,7 +3707,7 @@
               <a:pPr>
                 <a:defRPr/>
               </a:pPr>
-              <a:t>13/01/2025</a:t>
+              <a:t>14/01/2025</a:t>
             </a:fld>
             <a:endParaRPr lang="es-CO"/>
           </a:p>
@@ -5933,7 +5949,7 @@
           <a:p>
             <a:fld id="{9CF7635E-2D71-42E7-9E6C-FBB85A15A85F}" type="datetimeFigureOut">
               <a:rPr lang="es-CO" smtClean="0"/>
-              <a:t>13/01/2025</a:t>
+              <a:t>14/01/2025</a:t>
             </a:fld>
             <a:endParaRPr lang="es-CO"/>
           </a:p>
@@ -6199,7 +6215,7 @@
           <a:p>
             <a:fld id="{9CF7635E-2D71-42E7-9E6C-FBB85A15A85F}" type="datetimeFigureOut">
               <a:rPr lang="es-CO" smtClean="0"/>
-              <a:t>13/01/2025</a:t>
+              <a:t>14/01/2025</a:t>
             </a:fld>
             <a:endParaRPr lang="es-CO"/>
           </a:p>
@@ -6415,7 +6431,7 @@
           <a:p>
             <a:fld id="{9CF7635E-2D71-42E7-9E6C-FBB85A15A85F}" type="datetimeFigureOut">
               <a:rPr lang="es-CO" smtClean="0"/>
-              <a:t>13/01/2025</a:t>
+              <a:t>14/01/2025</a:t>
             </a:fld>
             <a:endParaRPr lang="es-CO"/>
           </a:p>
@@ -8044,7 +8060,7 @@
           <a:p>
             <a:fld id="{9CF7635E-2D71-42E7-9E6C-FBB85A15A85F}" type="datetimeFigureOut">
               <a:rPr lang="es-CO" smtClean="0"/>
-              <a:t>13/01/2025</a:t>
+              <a:t>14/01/2025</a:t>
             </a:fld>
             <a:endParaRPr lang="es-CO"/>
           </a:p>
@@ -8491,7 +8507,7 @@
           <a:p>
             <a:fld id="{9CF7635E-2D71-42E7-9E6C-FBB85A15A85F}" type="datetimeFigureOut">
               <a:rPr lang="es-CO" smtClean="0"/>
-              <a:t>13/01/2025</a:t>
+              <a:t>14/01/2025</a:t>
             </a:fld>
             <a:endParaRPr lang="es-CO"/>
           </a:p>
@@ -8765,7 +8781,7 @@
           <a:p>
             <a:fld id="{9CF7635E-2D71-42E7-9E6C-FBB85A15A85F}" type="datetimeFigureOut">
               <a:rPr lang="es-CO" smtClean="0"/>
-              <a:t>13/01/2025</a:t>
+              <a:t>14/01/2025</a:t>
             </a:fld>
             <a:endParaRPr lang="es-CO"/>
           </a:p>
@@ -9186,7 +9202,7 @@
           <a:p>
             <a:fld id="{9CF7635E-2D71-42E7-9E6C-FBB85A15A85F}" type="datetimeFigureOut">
               <a:rPr lang="es-CO" smtClean="0"/>
-              <a:t>13/01/2025</a:t>
+              <a:t>14/01/2025</a:t>
             </a:fld>
             <a:endParaRPr lang="es-CO"/>
           </a:p>
@@ -9334,7 +9350,7 @@
           <a:p>
             <a:fld id="{9CF7635E-2D71-42E7-9E6C-FBB85A15A85F}" type="datetimeFigureOut">
               <a:rPr lang="es-CO" smtClean="0"/>
-              <a:t>13/01/2025</a:t>
+              <a:t>14/01/2025</a:t>
             </a:fld>
             <a:endParaRPr lang="es-CO"/>
           </a:p>
@@ -9453,7 +9469,7 @@
           <a:p>
             <a:fld id="{9CF7635E-2D71-42E7-9E6C-FBB85A15A85F}" type="datetimeFigureOut">
               <a:rPr lang="es-CO" smtClean="0"/>
-              <a:t>13/01/2025</a:t>
+              <a:t>14/01/2025</a:t>
             </a:fld>
             <a:endParaRPr lang="es-CO"/>
           </a:p>
@@ -9772,7 +9788,7 @@
           <a:p>
             <a:fld id="{9CF7635E-2D71-42E7-9E6C-FBB85A15A85F}" type="datetimeFigureOut">
               <a:rPr lang="es-CO" smtClean="0"/>
-              <a:t>13/01/2025</a:t>
+              <a:t>14/01/2025</a:t>
             </a:fld>
             <a:endParaRPr lang="es-CO"/>
           </a:p>
@@ -10067,7 +10083,7 @@
           <a:p>
             <a:fld id="{9CF7635E-2D71-42E7-9E6C-FBB85A15A85F}" type="datetimeFigureOut">
               <a:rPr lang="es-CO" smtClean="0"/>
-              <a:t>13/01/2025</a:t>
+              <a:t>14/01/2025</a:t>
             </a:fld>
             <a:endParaRPr lang="es-CO"/>
           </a:p>
@@ -10316,7 +10332,7 @@
           <a:p>
             <a:fld id="{9CF7635E-2D71-42E7-9E6C-FBB85A15A85F}" type="datetimeFigureOut">
               <a:rPr lang="es-CO" smtClean="0"/>
-              <a:t>13/01/2025</a:t>
+              <a:t>14/01/2025</a:t>
             </a:fld>
             <a:endParaRPr lang="es-CO"/>
           </a:p>
@@ -18646,7 +18662,7 @@
         </p:nvSpPr>
         <p:spPr bwMode="auto">
           <a:xfrm>
-            <a:off x="611188" y="3068638"/>
+            <a:off x="611823" y="2708920"/>
             <a:ext cx="8229600" cy="1143000"/>
           </a:xfrm>
           <a:prstGeom prst="rect">
@@ -18828,7 +18844,7 @@
             </a:pPr>
             <a:r>
               <a:rPr lang="es-CO" altLang="es-CO" b="1" dirty="0"/>
-              <a:t>¿Preguntas?</a:t>
+              <a:t>MATERIAL DEL CURSO</a:t>
             </a:r>
           </a:p>
         </p:txBody>
@@ -19103,6 +19119,47 @@
                 </a:solidFill>
               </a:rPr>
               <a:t> 6065 SISTEMAS DE CONTROL II</a:t>
+            </a:r>
+          </a:p>
+        </p:txBody>
+      </p:sp>
+      <p:sp>
+        <p:nvSpPr>
+          <p:cNvPr id="3" name="CuadroTexto 2">
+            <a:extLst>
+              <a:ext uri="{FF2B5EF4-FFF2-40B4-BE49-F238E27FC236}">
+                <a16:creationId xmlns:a16="http://schemas.microsoft.com/office/drawing/2014/main" id="{008BB48C-FC05-3615-A776-2D1677A4E9F1}"/>
+              </a:ext>
+            </a:extLst>
+          </p:cNvPr>
+          <p:cNvSpPr txBox="1"/>
+          <p:nvPr/>
+        </p:nvSpPr>
+        <p:spPr>
+          <a:xfrm>
+            <a:off x="882002" y="4221088"/>
+            <a:ext cx="7689242" cy="369332"/>
+          </a:xfrm>
+          <a:prstGeom prst="rect">
+            <a:avLst/>
+          </a:prstGeom>
+          <a:noFill/>
+        </p:spPr>
+        <p:txBody>
+          <a:bodyPr wrap="square" rtlCol="0">
+            <a:spAutoFit/>
+          </a:bodyPr>
+          <a:lstStyle/>
+          <a:p>
+            <a:r>
+              <a:rPr lang="es-CO" dirty="0">
+                <a:hlinkClick r:id="rId4"/>
+              </a:rPr>
+              <a:t>https://github.com/F4bian1012/Sistemas-de-Control-II---Ingenier-a-Mecatr-nica</a:t>
+            </a:r>
+            <a:r>
+              <a:rPr lang="es-CO" dirty="0"/>
+              <a:t> </a:t>
             </a:r>
           </a:p>
         </p:txBody>
@@ -19977,6 +20034,23 @@
 </file>
 
 <file path=customXml/item1.xml><?xml version="1.0" encoding="utf-8"?>
+<?mso-contentType ?>
+<FormTemplates xmlns="http://schemas.microsoft.com/sharepoint/v3/contenttype/forms">
+  <Display>DocumentLibraryForm</Display>
+  <Edit>DocumentLibraryForm</Edit>
+  <New>DocumentLibraryForm</New>
+</FormTemplates>
+</file>
+
+<file path=customXml/item2.xml><?xml version="1.0" encoding="utf-8"?>
+<p:properties xmlns:p="http://schemas.microsoft.com/office/2006/metadata/properties" xmlns:xsi="http://www.w3.org/2001/XMLSchema-instance" xmlns:pc="http://schemas.microsoft.com/office/infopath/2007/PartnerControls">
+  <documentManagement>
+    <_activity xmlns="bdc56f61-abc0-4f7e-bfec-a93ccd1ae886" xsi:nil="true"/>
+  </documentManagement>
+</p:properties>
+</file>
+
+<file path=customXml/item3.xml><?xml version="1.0" encoding="utf-8"?>
 <ct:contentTypeSchema xmlns:ct="http://schemas.microsoft.com/office/2006/metadata/contentType" xmlns:ma="http://schemas.microsoft.com/office/2006/metadata/properties/metaAttributes" ct:_="" ma:_="" ma:contentTypeName="Documento" ma:contentTypeID="0x0101007A62137D465CE64A8C883A4664514BF8" ma:contentTypeVersion="15" ma:contentTypeDescription="Crear nuevo documento." ma:contentTypeScope="" ma:versionID="a1bd1d59f691eb9bca6952b111268275">
   <xsd:schema xmlns:xsd="http://www.w3.org/2001/XMLSchema" xmlns:xs="http://www.w3.org/2001/XMLSchema" xmlns:p="http://schemas.microsoft.com/office/2006/metadata/properties" xmlns:ns3="669280c1-d17e-4d1d-bd7f-b4f14cc6bf1d" xmlns:ns4="bdc56f61-abc0-4f7e-bfec-a93ccd1ae886" targetNamespace="http://schemas.microsoft.com/office/2006/metadata/properties" ma:root="true" ma:fieldsID="d02990a02f19f0f9fc7b999b1809cae4" ns3:_="" ns4:_="">
     <xsd:import namespace="669280c1-d17e-4d1d-bd7f-b4f14cc6bf1d"/>
@@ -20211,38 +20285,10 @@
 </ct:contentTypeSchema>
 </file>
 
-<file path=customXml/item2.xml><?xml version="1.0" encoding="utf-8"?>
-<p:properties xmlns:p="http://schemas.microsoft.com/office/2006/metadata/properties" xmlns:xsi="http://www.w3.org/2001/XMLSchema-instance" xmlns:pc="http://schemas.microsoft.com/office/infopath/2007/PartnerControls">
-  <documentManagement>
-    <_activity xmlns="bdc56f61-abc0-4f7e-bfec-a93ccd1ae886" xsi:nil="true"/>
-  </documentManagement>
-</p:properties>
-</file>
-
-<file path=customXml/item3.xml><?xml version="1.0" encoding="utf-8"?>
-<?mso-contentType ?>
-<FormTemplates xmlns="http://schemas.microsoft.com/sharepoint/v3/contenttype/forms">
-  <Display>DocumentLibraryForm</Display>
-  <Edit>DocumentLibraryForm</Edit>
-  <New>DocumentLibraryForm</New>
-</FormTemplates>
-</file>
-
 <file path=customXml/itemProps1.xml><?xml version="1.0" encoding="utf-8"?>
-<ds:datastoreItem xmlns:ds="http://schemas.openxmlformats.org/officeDocument/2006/customXml" ds:itemID="{025820C3-FD82-4EFC-BF14-EAF1F9613F52}">
+<ds:datastoreItem xmlns:ds="http://schemas.openxmlformats.org/officeDocument/2006/customXml" ds:itemID="{4E8623C8-32E1-48B0-9F0A-13F2E9582B7E}">
   <ds:schemaRefs>
-    <ds:schemaRef ds:uri="http://schemas.microsoft.com/office/2006/metadata/contentType"/>
-    <ds:schemaRef ds:uri="http://schemas.microsoft.com/office/2006/metadata/properties/metaAttributes"/>
-    <ds:schemaRef ds:uri="http://www.w3.org/2001/XMLSchema"/>
-    <ds:schemaRef ds:uri="http://schemas.microsoft.com/office/2006/metadata/properties"/>
-    <ds:schemaRef ds:uri="669280c1-d17e-4d1d-bd7f-b4f14cc6bf1d"/>
-    <ds:schemaRef ds:uri="bdc56f61-abc0-4f7e-bfec-a93ccd1ae886"/>
-    <ds:schemaRef ds:uri="http://schemas.microsoft.com/office/2006/documentManagement/types"/>
-    <ds:schemaRef ds:uri="http://schemas.microsoft.com/office/infopath/2007/PartnerControls"/>
-    <ds:schemaRef ds:uri="http://schemas.openxmlformats.org/package/2006/metadata/core-properties"/>
-    <ds:schemaRef ds:uri="http://purl.org/dc/elements/1.1/"/>
-    <ds:schemaRef ds:uri="http://purl.org/dc/terms/"/>
-    <ds:schemaRef ds:uri="http://schemas.microsoft.com/internal/obd"/>
+    <ds:schemaRef ds:uri="http://schemas.microsoft.com/sharepoint/v3/contenttype/forms"/>
   </ds:schemaRefs>
 </ds:datastoreItem>
 </file>
@@ -20265,9 +20311,20 @@
 </file>
 
 <file path=customXml/itemProps3.xml><?xml version="1.0" encoding="utf-8"?>
-<ds:datastoreItem xmlns:ds="http://schemas.openxmlformats.org/officeDocument/2006/customXml" ds:itemID="{4E8623C8-32E1-48B0-9F0A-13F2E9582B7E}">
+<ds:datastoreItem xmlns:ds="http://schemas.openxmlformats.org/officeDocument/2006/customXml" ds:itemID="{025820C3-FD82-4EFC-BF14-EAF1F9613F52}">
   <ds:schemaRefs>
-    <ds:schemaRef ds:uri="http://schemas.microsoft.com/sharepoint/v3/contenttype/forms"/>
+    <ds:schemaRef ds:uri="http://schemas.microsoft.com/office/2006/metadata/contentType"/>
+    <ds:schemaRef ds:uri="http://schemas.microsoft.com/office/2006/metadata/properties/metaAttributes"/>
+    <ds:schemaRef ds:uri="http://www.w3.org/2001/XMLSchema"/>
+    <ds:schemaRef ds:uri="http://schemas.microsoft.com/office/2006/metadata/properties"/>
+    <ds:schemaRef ds:uri="669280c1-d17e-4d1d-bd7f-b4f14cc6bf1d"/>
+    <ds:schemaRef ds:uri="bdc56f61-abc0-4f7e-bfec-a93ccd1ae886"/>
+    <ds:schemaRef ds:uri="http://schemas.microsoft.com/office/2006/documentManagement/types"/>
+    <ds:schemaRef ds:uri="http://schemas.microsoft.com/office/infopath/2007/PartnerControls"/>
+    <ds:schemaRef ds:uri="http://schemas.openxmlformats.org/package/2006/metadata/core-properties"/>
+    <ds:schemaRef ds:uri="http://purl.org/dc/elements/1.1/"/>
+    <ds:schemaRef ds:uri="http://purl.org/dc/terms/"/>
+    <ds:schemaRef ds:uri="http://schemas.microsoft.com/internal/obd"/>
   </ds:schemaRefs>
 </ds:datastoreItem>
 </file>
</xml_diff>